<commit_message>
Introduced logos, augmented other content.
</commit_message>
<xml_diff>
--- a/Markdown/BlokScriptDeck.pptx
+++ b/Markdown/BlokScriptDeck.pptx
@@ -279,7 +279,7 @@
           <a:p>
             <a:fld id="{876198E4-530E-4DFC-8C50-CF0EBA92F60C}" type="datetimeFigureOut">
               <a:rPr lang="en-US" smtClean="0"/>
-              <a:t>5/24/2024</a:t>
+              <a:t>5/26/2024</a:t>
             </a:fld>
             <a:endParaRPr lang="en-US"/>
           </a:p>
@@ -477,7 +477,7 @@
           <a:p>
             <a:fld id="{876198E4-530E-4DFC-8C50-CF0EBA92F60C}" type="datetimeFigureOut">
               <a:rPr lang="en-US" smtClean="0"/>
-              <a:t>5/24/2024</a:t>
+              <a:t>5/26/2024</a:t>
             </a:fld>
             <a:endParaRPr lang="en-US"/>
           </a:p>
@@ -685,7 +685,7 @@
           <a:p>
             <a:fld id="{876198E4-530E-4DFC-8C50-CF0EBA92F60C}" type="datetimeFigureOut">
               <a:rPr lang="en-US" smtClean="0"/>
-              <a:t>5/24/2024</a:t>
+              <a:t>5/26/2024</a:t>
             </a:fld>
             <a:endParaRPr lang="en-US"/>
           </a:p>
@@ -883,7 +883,7 @@
           <a:p>
             <a:fld id="{876198E4-530E-4DFC-8C50-CF0EBA92F60C}" type="datetimeFigureOut">
               <a:rPr lang="en-US" smtClean="0"/>
-              <a:t>5/24/2024</a:t>
+              <a:t>5/26/2024</a:t>
             </a:fld>
             <a:endParaRPr lang="en-US"/>
           </a:p>
@@ -1158,7 +1158,7 @@
           <a:p>
             <a:fld id="{876198E4-530E-4DFC-8C50-CF0EBA92F60C}" type="datetimeFigureOut">
               <a:rPr lang="en-US" smtClean="0"/>
-              <a:t>5/24/2024</a:t>
+              <a:t>5/26/2024</a:t>
             </a:fld>
             <a:endParaRPr lang="en-US"/>
           </a:p>
@@ -1423,7 +1423,7 @@
           <a:p>
             <a:fld id="{876198E4-530E-4DFC-8C50-CF0EBA92F60C}" type="datetimeFigureOut">
               <a:rPr lang="en-US" smtClean="0"/>
-              <a:t>5/24/2024</a:t>
+              <a:t>5/26/2024</a:t>
             </a:fld>
             <a:endParaRPr lang="en-US"/>
           </a:p>
@@ -1835,7 +1835,7 @@
           <a:p>
             <a:fld id="{876198E4-530E-4DFC-8C50-CF0EBA92F60C}" type="datetimeFigureOut">
               <a:rPr lang="en-US" smtClean="0"/>
-              <a:t>5/24/2024</a:t>
+              <a:t>5/26/2024</a:t>
             </a:fld>
             <a:endParaRPr lang="en-US"/>
           </a:p>
@@ -1976,7 +1976,7 @@
           <a:p>
             <a:fld id="{876198E4-530E-4DFC-8C50-CF0EBA92F60C}" type="datetimeFigureOut">
               <a:rPr lang="en-US" smtClean="0"/>
-              <a:t>5/24/2024</a:t>
+              <a:t>5/26/2024</a:t>
             </a:fld>
             <a:endParaRPr lang="en-US"/>
           </a:p>
@@ -2089,7 +2089,7 @@
           <a:p>
             <a:fld id="{876198E4-530E-4DFC-8C50-CF0EBA92F60C}" type="datetimeFigureOut">
               <a:rPr lang="en-US" smtClean="0"/>
-              <a:t>5/24/2024</a:t>
+              <a:t>5/26/2024</a:t>
             </a:fld>
             <a:endParaRPr lang="en-US"/>
           </a:p>
@@ -2400,7 +2400,7 @@
           <a:p>
             <a:fld id="{876198E4-530E-4DFC-8C50-CF0EBA92F60C}" type="datetimeFigureOut">
               <a:rPr lang="en-US" smtClean="0"/>
-              <a:t>5/24/2024</a:t>
+              <a:t>5/26/2024</a:t>
             </a:fld>
             <a:endParaRPr lang="en-US"/>
           </a:p>
@@ -2688,7 +2688,7 @@
           <a:p>
             <a:fld id="{876198E4-530E-4DFC-8C50-CF0EBA92F60C}" type="datetimeFigureOut">
               <a:rPr lang="en-US" smtClean="0"/>
-              <a:t>5/24/2024</a:t>
+              <a:t>5/26/2024</a:t>
             </a:fld>
             <a:endParaRPr lang="en-US"/>
           </a:p>
@@ -2929,7 +2929,7 @@
           <a:p>
             <a:fld id="{876198E4-530E-4DFC-8C50-CF0EBA92F60C}" type="datetimeFigureOut">
               <a:rPr lang="en-US" smtClean="0"/>
-              <a:t>5/24/2024</a:t>
+              <a:t>5/26/2024</a:t>
             </a:fld>
             <a:endParaRPr lang="en-US"/>
           </a:p>
@@ -3348,34 +3348,6 @@
       </p:grpSpPr>
       <p:sp>
         <p:nvSpPr>
-          <p:cNvPr id="2" name="Title 1">
-            <a:extLst>
-              <a:ext uri="{FF2B5EF4-FFF2-40B4-BE49-F238E27FC236}">
-                <a16:creationId xmlns:a16="http://schemas.microsoft.com/office/drawing/2014/main" id="{0FF15F44-7409-0BE9-E2CF-FAFCEE2C1294}"/>
-              </a:ext>
-            </a:extLst>
-          </p:cNvPr>
-          <p:cNvSpPr>
-            <a:spLocks noGrp="1"/>
-          </p:cNvSpPr>
-          <p:nvPr>
-            <p:ph type="ctrTitle"/>
-          </p:nvPr>
-        </p:nvSpPr>
-        <p:spPr/>
-        <p:txBody>
-          <a:bodyPr/>
-          <a:lstStyle/>
-          <a:p>
-            <a:r>
-              <a:rPr lang="en-US" dirty="0"/>
-              <a:t>BlokScript</a:t>
-            </a:r>
-          </a:p>
-        </p:txBody>
-      </p:sp>
-      <p:sp>
-        <p:nvSpPr>
           <p:cNvPr id="3" name="Subtitle 2">
             <a:extLst>
               <a:ext uri="{FF2B5EF4-FFF2-40B4-BE49-F238E27FC236}">
@@ -3390,7 +3362,12 @@
             <p:ph type="subTitle" idx="1"/>
           </p:nvPr>
         </p:nvSpPr>
-        <p:spPr/>
+        <p:spPr>
+          <a:xfrm>
+            <a:off x="1524000" y="3602038"/>
+            <a:ext cx="9144000" cy="1655762"/>
+          </a:xfrm>
+        </p:spPr>
         <p:txBody>
           <a:bodyPr>
             <a:normAutofit/>
@@ -3416,6 +3393,42 @@
           </a:p>
         </p:txBody>
       </p:sp>
+      <p:pic>
+        <p:nvPicPr>
+          <p:cNvPr id="5" name="Picture 4">
+            <a:extLst>
+              <a:ext uri="{FF2B5EF4-FFF2-40B4-BE49-F238E27FC236}">
+                <a16:creationId xmlns:a16="http://schemas.microsoft.com/office/drawing/2014/main" id="{1FDCB91D-CFD2-E851-7071-CBEDAA62B841}"/>
+              </a:ext>
+            </a:extLst>
+          </p:cNvPr>
+          <p:cNvPicPr>
+            <a:picLocks noChangeAspect="1"/>
+          </p:cNvPicPr>
+          <p:nvPr/>
+        </p:nvPicPr>
+        <p:blipFill>
+          <a:blip r:embed="rId3">
+            <a:extLst>
+              <a:ext uri="{28A0092B-C50C-407E-A947-70E740481C1C}">
+                <a14:useLocalDpi xmlns:a14="http://schemas.microsoft.com/office/drawing/2010/main" val="0"/>
+              </a:ext>
+            </a:extLst>
+          </a:blip>
+          <a:stretch>
+            <a:fillRect/>
+          </a:stretch>
+        </p:blipFill>
+        <p:spPr>
+          <a:xfrm>
+            <a:off x="1524000" y="2514600"/>
+            <a:ext cx="9144000" cy="815029"/>
+          </a:xfrm>
+          <a:prstGeom prst="rect">
+            <a:avLst/>
+          </a:prstGeom>
+        </p:spPr>
+      </p:pic>
     </p:spTree>
     <p:extLst>
       <p:ext uri="{BB962C8B-B14F-4D97-AF65-F5344CB8AC3E}">

</xml_diff>